<commit_message>
I'm hooked on a feeling
</commit_message>
<xml_diff>
--- a/wild-world-web.pptx
+++ b/wild-world-web.pptx
@@ -663,13 +663,19 @@
               <a:rPr lang="en-US" baseline="0" dirty="0" smtClean="0">
                 <a:latin typeface="Palatino Linotype" panose="02040502050505030304" pitchFamily="18" charset="0"/>
               </a:rPr>
-              <a:t> web and what we can do </a:t>
+              <a:t> web and what we </a:t>
             </a:r>
             <a:r>
               <a:rPr lang="en-US" baseline="0" dirty="0" smtClean="0">
                 <a:latin typeface="Palatino Linotype" panose="02040502050505030304" pitchFamily="18" charset="0"/>
               </a:rPr>
-              <a:t>to offer widely compatible sites and applications.</a:t>
+              <a:t>as developers and designers can </a:t>
+            </a:r>
+            <a:r>
+              <a:rPr lang="en-US" baseline="0" dirty="0" smtClean="0">
+                <a:latin typeface="Palatino Linotype" panose="02040502050505030304" pitchFamily="18" charset="0"/>
+              </a:rPr>
+              <a:t>do to offer widely compatible sites and applications.</a:t>
             </a:r>
             <a:endParaRPr lang="en-US" b="1" dirty="0"/>
           </a:p>
@@ -1113,13 +1119,8 @@
           <a:p>
             <a:r>
               <a:rPr lang="en-US" baseline="0" dirty="0" smtClean="0"/>
-              <a:t>They used the simple Modernizr.touch test to see if I was on a phone, not understanding that laptops can </a:t>
-            </a:r>
-            <a:r>
-              <a:rPr lang="en-US" baseline="0" dirty="0" smtClean="0"/>
-              <a:t>also return true for the Modernizr.touch test</a:t>
-            </a:r>
-            <a:endParaRPr lang="en-US" baseline="0" dirty="0" smtClean="0"/>
+              <a:t>They used the simple Modernizr.touch test to see if I was on a phone, not understanding that laptops can also return true for the Modernizr.touch test</a:t>
+            </a:r>
           </a:p>
         </p:txBody>
       </p:sp>
@@ -1214,19 +1215,7 @@
             </a:r>
             <a:r>
               <a:rPr lang="en-US" baseline="0" dirty="0" smtClean="0"/>
-              <a:t> shot from the same laptop, just in IE11, which doesn’t </a:t>
-            </a:r>
-            <a:r>
-              <a:rPr lang="en-US" baseline="0" dirty="0" smtClean="0"/>
-              <a:t>return true for </a:t>
-            </a:r>
-            <a:r>
-              <a:rPr lang="en-US" baseline="0" dirty="0" smtClean="0"/>
-              <a:t>Modernizr.touch </a:t>
-            </a:r>
-            <a:r>
-              <a:rPr lang="en-US" baseline="0" dirty="0" smtClean="0"/>
-              <a:t>as it uses a separate API for handling events</a:t>
+              <a:t> shot from the same laptop, just in IE11, which doesn’t return true for Modernizr.touch as it uses a separate API for handling events</a:t>
             </a:r>
             <a:endParaRPr lang="en-US" dirty="0"/>
           </a:p>
@@ -1807,11 +1796,6 @@
               </a:rPr>
               <a:t>. </a:t>
             </a:r>
-            <a:endParaRPr lang="en-US" dirty="0" smtClean="0">
-              <a:latin typeface="Verdana" panose="020B0604030504040204" pitchFamily="34" charset="0"/>
-              <a:ea typeface="Verdana" panose="020B0604030504040204" pitchFamily="34" charset="0"/>
-              <a:cs typeface="Verdana" panose="020B0604030504040204" pitchFamily="34" charset="0"/>
-            </a:endParaRPr>
           </a:p>
           <a:p>
             <a:r>
@@ -1945,7 +1929,11 @@
             </a:r>
             <a:r>
               <a:rPr lang="en-US" baseline="0" dirty="0" smtClean="0"/>
-              <a:t>b was basically Internet Explorer 6</a:t>
+              <a:t>b was basically Internet Explorer </a:t>
+            </a:r>
+            <a:r>
+              <a:rPr lang="en-US" baseline="0" dirty="0" smtClean="0"/>
+              <a:t>6. There was a hint of Opera, a smattering of Netscape Navigator, and a few people on Macs and running Linux, but really, the web was one web browser on one OS. </a:t>
             </a:r>
             <a:endParaRPr lang="en-US" dirty="0"/>
           </a:p>
@@ -2953,15 +2941,7 @@
             </a:r>
             <a:r>
               <a:rPr lang="en-US" baseline="0" dirty="0" smtClean="0"/>
-              <a:t> browsers and operating systems. This will get you pretty </a:t>
-            </a:r>
-            <a:r>
-              <a:rPr lang="en-US" baseline="0" dirty="0" smtClean="0"/>
-              <a:t>awesome, if not complete, </a:t>
-            </a:r>
-            <a:r>
-              <a:rPr lang="en-US" baseline="0" dirty="0" smtClean="0"/>
-              <a:t>coverage. This is also a lot of devices to buy and maintain. If you can do it, you should. If not, you can scale back, to…</a:t>
+              <a:t> browsers and operating systems. This will get you pretty awesome, if not complete, coverage. This is also a lot of devices to buy and maintain. If you can do it, you should. If not, you can scale back, to…</a:t>
             </a:r>
             <a:endParaRPr lang="en-US" dirty="0"/>
           </a:p>
@@ -3171,7 +3151,23 @@
                 <a:ea typeface="Verdana" panose="020B0604030504040204" pitchFamily="34" charset="0"/>
                 <a:cs typeface="Verdana" panose="020B0604030504040204" pitchFamily="34" charset="0"/>
               </a:rPr>
-              <a:t> Internet Explorer family (IE5-IE6) represented 95% of the web</a:t>
+              <a:t> Internet Explorer family (</a:t>
+            </a:r>
+            <a:r>
+              <a:rPr lang="en-US" dirty="0" smtClean="0">
+                <a:latin typeface="Verdana" panose="020B0604030504040204" pitchFamily="34" charset="0"/>
+                <a:ea typeface="Verdana" panose="020B0604030504040204" pitchFamily="34" charset="0"/>
+                <a:cs typeface="Verdana" panose="020B0604030504040204" pitchFamily="34" charset="0"/>
+              </a:rPr>
+              <a:t>IE5,IE5.5 and IE6</a:t>
+            </a:r>
+            <a:r>
+              <a:rPr lang="en-US" dirty="0" smtClean="0">
+                <a:latin typeface="Verdana" panose="020B0604030504040204" pitchFamily="34" charset="0"/>
+                <a:ea typeface="Verdana" panose="020B0604030504040204" pitchFamily="34" charset="0"/>
+                <a:cs typeface="Verdana" panose="020B0604030504040204" pitchFamily="34" charset="0"/>
+              </a:rPr>
+              <a:t>) represented 95% of the web</a:t>
             </a:r>
           </a:p>
           <a:p>
@@ -3340,11 +3336,6 @@
               </a:rPr>
               <a:t> as early and as often as you can. </a:t>
             </a:r>
-            <a:endParaRPr lang="en-US" dirty="0" smtClean="0">
-              <a:latin typeface="Verdana" panose="020B0604030504040204" pitchFamily="34" charset="0"/>
-              <a:ea typeface="Verdana" panose="020B0604030504040204" pitchFamily="34" charset="0"/>
-              <a:cs typeface="Verdana" panose="020B0604030504040204" pitchFamily="34" charset="0"/>
-            </a:endParaRPr>
           </a:p>
           <a:p>
             <a:pPr marL="0" marR="0" indent="0" algn="l" defTabSz="931774" rtl="0" eaLnBrk="1" fontAlgn="auto" latinLnBrk="0" hangingPunct="1">
@@ -3475,39 +3466,7 @@
                 <a:ea typeface="Verdana" panose="020B0604030504040204" pitchFamily="34" charset="0"/>
                 <a:cs typeface="Verdana" panose="020B0604030504040204" pitchFamily="34" charset="0"/>
               </a:rPr>
-              <a:t>Your site is not an absolute thing. The best possible site you can have will be the best possible site for everyone that visits it. If that means it's a high DPI, 25MB monstrosity for a guy on a </a:t>
-            </a:r>
-            <a:r>
-              <a:rPr lang="en-US" dirty="0" smtClean="0">
-                <a:latin typeface="Verdana" panose="020B0604030504040204" pitchFamily="34" charset="0"/>
-                <a:ea typeface="Verdana" panose="020B0604030504040204" pitchFamily="34" charset="0"/>
-                <a:cs typeface="Verdana" panose="020B0604030504040204" pitchFamily="34" charset="0"/>
-              </a:rPr>
-              <a:t>MacBook </a:t>
-            </a:r>
-            <a:r>
-              <a:rPr lang="en-US" dirty="0" smtClean="0">
-                <a:latin typeface="Verdana" panose="020B0604030504040204" pitchFamily="34" charset="0"/>
-                <a:ea typeface="Verdana" panose="020B0604030504040204" pitchFamily="34" charset="0"/>
-                <a:cs typeface="Verdana" panose="020B0604030504040204" pitchFamily="34" charset="0"/>
-              </a:rPr>
-              <a:t>air in a coffee shop in Palo Alto or just a logo and an unordered list for someone on </a:t>
-            </a:r>
-            <a:r>
-              <a:rPr lang="en-US" dirty="0" smtClean="0">
-                <a:latin typeface="Verdana" panose="020B0604030504040204" pitchFamily="34" charset="0"/>
-                <a:ea typeface="Verdana" panose="020B0604030504040204" pitchFamily="34" charset="0"/>
-                <a:cs typeface="Verdana" panose="020B0604030504040204" pitchFamily="34" charset="0"/>
-              </a:rPr>
-              <a:t>a-rented-by-the-minute phone </a:t>
-            </a:r>
-            <a:r>
-              <a:rPr lang="en-US" dirty="0" smtClean="0">
-                <a:latin typeface="Verdana" panose="020B0604030504040204" pitchFamily="34" charset="0"/>
-                <a:ea typeface="Verdana" panose="020B0604030504040204" pitchFamily="34" charset="0"/>
-                <a:cs typeface="Verdana" panose="020B0604030504040204" pitchFamily="34" charset="0"/>
-              </a:rPr>
-              <a:t>in Lagos, then that's the way it is. </a:t>
+              <a:t>Your site is not an absolute thing. The best possible site you can have will be the best possible site for everyone that visits it. If that means it's a high DPI, 25MB monstrosity for a guy on a MacBook air in a coffee shop in Palo Alto or just a logo and an unordered list for someone on a-rented-by-the-minute phone in Lagos, then that's the way it is. </a:t>
             </a:r>
           </a:p>
           <a:p>
@@ -3728,11 +3687,7 @@
             </a:r>
             <a:r>
               <a:rPr lang="en-US" baseline="0" dirty="0" smtClean="0"/>
-              <a:t> accessibility enhancements are woven into the fabric of society. Some like this wine bottle, you might notice, but many you don’t because </a:t>
-            </a:r>
-            <a:r>
-              <a:rPr lang="en-US" baseline="0" dirty="0" smtClean="0"/>
-              <a:t>they’re everywhere</a:t>
+              <a:t> accessibility enhancements are woven into the fabric of society. Some like this wine bottle, you might notice, but many you don’t because they’re everywhere</a:t>
             </a:r>
             <a:endParaRPr lang="en-US" dirty="0"/>
           </a:p>
@@ -3901,15 +3856,7 @@
                 <a:ea typeface="Verdana" panose="020B0604030504040204" pitchFamily="34" charset="0"/>
                 <a:cs typeface="Verdana" panose="020B0604030504040204" pitchFamily="34" charset="0"/>
               </a:rPr>
-              <a:t>The US represents just a fraction of the population of web users. </a:t>
-            </a:r>
-            <a:r>
-              <a:rPr lang="en-US" baseline="0" dirty="0" smtClean="0">
-                <a:latin typeface="Verdana" panose="020B0604030504040204" pitchFamily="34" charset="0"/>
-                <a:ea typeface="Verdana" panose="020B0604030504040204" pitchFamily="34" charset="0"/>
-                <a:cs typeface="Verdana" panose="020B0604030504040204" pitchFamily="34" charset="0"/>
-              </a:rPr>
-              <a:t> There are any more millions of users worldwide. </a:t>
+              <a:t>The US represents just a fraction of the population of web users.  There are any more millions of users worldwide. </a:t>
             </a:r>
             <a:endParaRPr lang="en-US" dirty="0" smtClean="0">
               <a:latin typeface="Verdana" panose="020B0604030504040204" pitchFamily="34" charset="0"/>
@@ -4866,7 +4813,15 @@
                 <a:ea typeface="Verdana" panose="020B0604030504040204" pitchFamily="34" charset="0"/>
                 <a:cs typeface="Verdana" panose="020B0604030504040204" pitchFamily="34" charset="0"/>
               </a:rPr>
-              <a:t> for development (Think: 960 pixel grids) and we relied on a bunch</a:t>
+              <a:t> for </a:t>
+            </a:r>
+            <a:r>
+              <a:rPr lang="en-US" dirty="0" smtClean="0">
+                <a:latin typeface="Verdana" panose="020B0604030504040204" pitchFamily="34" charset="0"/>
+                <a:ea typeface="Verdana" panose="020B0604030504040204" pitchFamily="34" charset="0"/>
+                <a:cs typeface="Verdana" panose="020B0604030504040204" pitchFamily="34" charset="0"/>
+              </a:rPr>
+              <a:t>development. One common example</a:t>
             </a:r>
             <a:r>
               <a:rPr lang="en-US" baseline="0" dirty="0" smtClean="0">
@@ -4874,90 +4829,7 @@
                 <a:ea typeface="Verdana" panose="020B0604030504040204" pitchFamily="34" charset="0"/>
                 <a:cs typeface="Verdana" panose="020B0604030504040204" pitchFamily="34" charset="0"/>
               </a:rPr>
-              <a:t> of </a:t>
-            </a:r>
-            <a:r>
-              <a:rPr lang="en-US" dirty="0" smtClean="0">
-                <a:latin typeface="Verdana" panose="020B0604030504040204" pitchFamily="34" charset="0"/>
-                <a:ea typeface="Verdana" panose="020B0604030504040204" pitchFamily="34" charset="0"/>
-                <a:cs typeface="Verdana" panose="020B0604030504040204" pitchFamily="34" charset="0"/>
-              </a:rPr>
-              <a:t>browser specific fixes (think of the Netscape Navigator resize fix and IE conditional)</a:t>
-            </a:r>
-            <a:r>
-              <a:rPr lang="en-US" b="1" dirty="0" smtClean="0">
-                <a:latin typeface="Verdana" panose="020B0604030504040204" pitchFamily="34" charset="0"/>
-                <a:ea typeface="Verdana" panose="020B0604030504040204" pitchFamily="34" charset="0"/>
-                <a:cs typeface="Verdana" panose="020B0604030504040204" pitchFamily="34" charset="0"/>
-              </a:rPr>
-              <a:t> </a:t>
-            </a:r>
-            <a:endParaRPr lang="en-US" b="0" dirty="0" smtClean="0">
-              <a:latin typeface="Verdana" panose="020B0604030504040204" pitchFamily="34" charset="0"/>
-              <a:ea typeface="Verdana" panose="020B0604030504040204" pitchFamily="34" charset="0"/>
-              <a:cs typeface="Verdana" panose="020B0604030504040204" pitchFamily="34" charset="0"/>
-            </a:endParaRPr>
-          </a:p>
-          <a:p>
-            <a:pPr>
-              <a:lnSpc>
-                <a:spcPct val="120000"/>
-              </a:lnSpc>
-            </a:pPr>
-            <a:r>
-              <a:rPr lang="en-US" dirty="0" smtClean="0">
-                <a:latin typeface="Verdana" panose="020B0604030504040204" pitchFamily="34" charset="0"/>
-                <a:ea typeface="Verdana" panose="020B0604030504040204" pitchFamily="34" charset="0"/>
-                <a:cs typeface="Verdana" panose="020B0604030504040204" pitchFamily="34" charset="0"/>
-              </a:rPr>
-              <a:t>A dedicated developer could keep cross</a:t>
-            </a:r>
-            <a:r>
-              <a:rPr lang="en-US" baseline="0" dirty="0" smtClean="0">
-                <a:latin typeface="Verdana" panose="020B0604030504040204" pitchFamily="34" charset="0"/>
-                <a:ea typeface="Verdana" panose="020B0604030504040204" pitchFamily="34" charset="0"/>
-                <a:cs typeface="Verdana" panose="020B0604030504040204" pitchFamily="34" charset="0"/>
-              </a:rPr>
-              <a:t> </a:t>
-            </a:r>
-            <a:r>
-              <a:rPr lang="en-US" dirty="0" smtClean="0">
-                <a:latin typeface="Verdana" panose="020B0604030504040204" pitchFamily="34" charset="0"/>
-                <a:ea typeface="Verdana" panose="020B0604030504040204" pitchFamily="34" charset="0"/>
-                <a:cs typeface="Verdana" panose="020B0604030504040204" pitchFamily="34" charset="0"/>
-              </a:rPr>
-              <a:t>browser issues </a:t>
-            </a:r>
-            <a:r>
-              <a:rPr lang="en-US" baseline="0" dirty="0" smtClean="0">
-                <a:latin typeface="Verdana" panose="020B0604030504040204" pitchFamily="34" charset="0"/>
-                <a:ea typeface="Verdana" panose="020B0604030504040204" pitchFamily="34" charset="0"/>
-                <a:cs typeface="Verdana" panose="020B0604030504040204" pitchFamily="34" charset="0"/>
-              </a:rPr>
-              <a:t>in their head and code around them by hand. </a:t>
-            </a:r>
-          </a:p>
-          <a:p>
-            <a:pPr>
-              <a:lnSpc>
-                <a:spcPct val="120000"/>
-              </a:lnSpc>
-            </a:pPr>
-            <a:r>
-              <a:rPr lang="en-US" baseline="0" dirty="0" smtClean="0">
-                <a:latin typeface="Verdana" panose="020B0604030504040204" pitchFamily="34" charset="0"/>
-                <a:ea typeface="Verdana" panose="020B0604030504040204" pitchFamily="34" charset="0"/>
-                <a:cs typeface="Verdana" panose="020B0604030504040204" pitchFamily="34" charset="0"/>
-              </a:rPr>
-              <a:t>We had a c</a:t>
-            </a:r>
-            <a:r>
-              <a:rPr lang="en-US" dirty="0" smtClean="0">
-                <a:latin typeface="Verdana" panose="020B0604030504040204" pitchFamily="34" charset="0"/>
-                <a:ea typeface="Verdana" panose="020B0604030504040204" pitchFamily="34" charset="0"/>
-                <a:cs typeface="Verdana" panose="020B0604030504040204" pitchFamily="34" charset="0"/>
-              </a:rPr>
-              <a:t>alcified specification landscape</a:t>
+              <a:t> is the ubiquity of the 960 pixel grid everyone used as the basis of their designs. This number, calculated against the dominant screen resolution, was the de facto starting point for countless designs. </a:t>
             </a:r>
           </a:p>
           <a:p>
@@ -4967,22 +4839,11 @@
               </a:lnSpc>
               <a:defRPr/>
             </a:pPr>
-            <a:r>
-              <a:rPr lang="en-US" dirty="0" smtClean="0">
-                <a:latin typeface="Verdana" panose="020B0604030504040204" pitchFamily="34" charset="0"/>
-                <a:ea typeface="Verdana" panose="020B0604030504040204" pitchFamily="34" charset="0"/>
-                <a:cs typeface="Verdana" panose="020B0604030504040204" pitchFamily="34" charset="0"/>
-              </a:rPr>
-              <a:t>Between December 1997 and September 2001 we had several major</a:t>
-            </a:r>
-            <a:r>
-              <a:rPr lang="en-US" baseline="0" dirty="0" smtClean="0">
-                <a:latin typeface="Verdana" panose="020B0604030504040204" pitchFamily="34" charset="0"/>
-                <a:ea typeface="Verdana" panose="020B0604030504040204" pitchFamily="34" charset="0"/>
-                <a:cs typeface="Verdana" panose="020B0604030504040204" pitchFamily="34" charset="0"/>
-              </a:rPr>
-              <a:t> releases. </a:t>
-            </a:r>
+            <a:endParaRPr lang="en-US" baseline="0" dirty="0" smtClean="0">
+              <a:latin typeface="Verdana" panose="020B0604030504040204" pitchFamily="34" charset="0"/>
+              <a:ea typeface="Verdana" panose="020B0604030504040204" pitchFamily="34" charset="0"/>
+              <a:cs typeface="Verdana" panose="020B0604030504040204" pitchFamily="34" charset="0"/>
+            </a:endParaRPr>
           </a:p>
           <a:p>
             <a:pPr marL="0" lvl="1" defTabSz="931774">
@@ -4997,7 +4858,286 @@
                 <a:ea typeface="Verdana" panose="020B0604030504040204" pitchFamily="34" charset="0"/>
                 <a:cs typeface="Verdana" panose="020B0604030504040204" pitchFamily="34" charset="0"/>
               </a:rPr>
-              <a:t>HTML4.0</a:t>
+              <a:t>We also </a:t>
+            </a:r>
+            <a:r>
+              <a:rPr lang="en-US" dirty="0" smtClean="0">
+                <a:latin typeface="Verdana" panose="020B0604030504040204" pitchFamily="34" charset="0"/>
+                <a:ea typeface="Verdana" panose="020B0604030504040204" pitchFamily="34" charset="0"/>
+                <a:cs typeface="Verdana" panose="020B0604030504040204" pitchFamily="34" charset="0"/>
+              </a:rPr>
+              <a:t>relied on a bunch</a:t>
+            </a:r>
+            <a:r>
+              <a:rPr lang="en-US" baseline="0" dirty="0" smtClean="0">
+                <a:latin typeface="Verdana" panose="020B0604030504040204" pitchFamily="34" charset="0"/>
+                <a:ea typeface="Verdana" panose="020B0604030504040204" pitchFamily="34" charset="0"/>
+                <a:cs typeface="Verdana" panose="020B0604030504040204" pitchFamily="34" charset="0"/>
+              </a:rPr>
+              <a:t> of </a:t>
+            </a:r>
+            <a:r>
+              <a:rPr lang="en-US" dirty="0" smtClean="0">
+                <a:latin typeface="Verdana" panose="020B0604030504040204" pitchFamily="34" charset="0"/>
+                <a:ea typeface="Verdana" panose="020B0604030504040204" pitchFamily="34" charset="0"/>
+                <a:cs typeface="Verdana" panose="020B0604030504040204" pitchFamily="34" charset="0"/>
+              </a:rPr>
+              <a:t>browser specific </a:t>
+            </a:r>
+            <a:r>
+              <a:rPr lang="en-US" dirty="0" smtClean="0">
+                <a:latin typeface="Verdana" panose="020B0604030504040204" pitchFamily="34" charset="0"/>
+                <a:ea typeface="Verdana" panose="020B0604030504040204" pitchFamily="34" charset="0"/>
+                <a:cs typeface="Verdana" panose="020B0604030504040204" pitchFamily="34" charset="0"/>
+              </a:rPr>
+              <a:t>fixes.</a:t>
+            </a:r>
+            <a:r>
+              <a:rPr lang="en-US" baseline="0" dirty="0" smtClean="0">
+                <a:latin typeface="Verdana" panose="020B0604030504040204" pitchFamily="34" charset="0"/>
+                <a:ea typeface="Verdana" panose="020B0604030504040204" pitchFamily="34" charset="0"/>
+                <a:cs typeface="Verdana" panose="020B0604030504040204" pitchFamily="34" charset="0"/>
+              </a:rPr>
+              <a:t> T</a:t>
+            </a:r>
+            <a:r>
+              <a:rPr lang="en-US" dirty="0" smtClean="0">
+                <a:latin typeface="Verdana" panose="020B0604030504040204" pitchFamily="34" charset="0"/>
+                <a:ea typeface="Verdana" panose="020B0604030504040204" pitchFamily="34" charset="0"/>
+                <a:cs typeface="Verdana" panose="020B0604030504040204" pitchFamily="34" charset="0"/>
+              </a:rPr>
+              <a:t>he </a:t>
+            </a:r>
+            <a:r>
+              <a:rPr lang="en-US" dirty="0" smtClean="0">
+                <a:latin typeface="Verdana" panose="020B0604030504040204" pitchFamily="34" charset="0"/>
+                <a:ea typeface="Verdana" panose="020B0604030504040204" pitchFamily="34" charset="0"/>
+                <a:cs typeface="Verdana" panose="020B0604030504040204" pitchFamily="34" charset="0"/>
+              </a:rPr>
+              <a:t>Netscape Navigator resize </a:t>
+            </a:r>
+            <a:r>
+              <a:rPr lang="en-US" dirty="0" smtClean="0">
+                <a:latin typeface="Verdana" panose="020B0604030504040204" pitchFamily="34" charset="0"/>
+                <a:ea typeface="Verdana" panose="020B0604030504040204" pitchFamily="34" charset="0"/>
+                <a:cs typeface="Verdana" panose="020B0604030504040204" pitchFamily="34" charset="0"/>
+              </a:rPr>
+              <a:t>fix, if you don’t know about it check it out- at one</a:t>
+            </a:r>
+            <a:r>
+              <a:rPr lang="en-US" baseline="0" dirty="0" smtClean="0">
+                <a:latin typeface="Verdana" panose="020B0604030504040204" pitchFamily="34" charset="0"/>
+                <a:ea typeface="Verdana" panose="020B0604030504040204" pitchFamily="34" charset="0"/>
+                <a:cs typeface="Verdana" panose="020B0604030504040204" pitchFamily="34" charset="0"/>
+              </a:rPr>
+              <a:t> point it has to have been the most widely distributed single piece of code on the web;</a:t>
+            </a:r>
+            <a:r>
+              <a:rPr lang="en-US" dirty="0" smtClean="0">
+                <a:latin typeface="Verdana" panose="020B0604030504040204" pitchFamily="34" charset="0"/>
+                <a:ea typeface="Verdana" panose="020B0604030504040204" pitchFamily="34" charset="0"/>
+                <a:cs typeface="Verdana" panose="020B0604030504040204" pitchFamily="34" charset="0"/>
+              </a:rPr>
+              <a:t> </a:t>
+            </a:r>
+            <a:r>
+              <a:rPr lang="en-US" dirty="0" smtClean="0">
+                <a:latin typeface="Verdana" panose="020B0604030504040204" pitchFamily="34" charset="0"/>
+                <a:ea typeface="Verdana" panose="020B0604030504040204" pitchFamily="34" charset="0"/>
+                <a:cs typeface="Verdana" panose="020B0604030504040204" pitchFamily="34" charset="0"/>
+              </a:rPr>
+              <a:t>and </a:t>
+            </a:r>
+            <a:r>
+              <a:rPr lang="en-US" dirty="0" smtClean="0">
+                <a:latin typeface="Verdana" panose="020B0604030504040204" pitchFamily="34" charset="0"/>
+                <a:ea typeface="Verdana" panose="020B0604030504040204" pitchFamily="34" charset="0"/>
+                <a:cs typeface="Verdana" panose="020B0604030504040204" pitchFamily="34" charset="0"/>
+              </a:rPr>
+              <a:t>the still common use of IE conditional comments to target IE specific fixes are just the most common examples. </a:t>
+            </a:r>
+            <a:r>
+              <a:rPr lang="en-US" b="1" dirty="0" smtClean="0">
+                <a:latin typeface="Verdana" panose="020B0604030504040204" pitchFamily="34" charset="0"/>
+                <a:ea typeface="Verdana" panose="020B0604030504040204" pitchFamily="34" charset="0"/>
+                <a:cs typeface="Verdana" panose="020B0604030504040204" pitchFamily="34" charset="0"/>
+              </a:rPr>
+              <a:t> </a:t>
+            </a:r>
+            <a:r>
+              <a:rPr lang="en-US" b="0" dirty="0" smtClean="0">
+                <a:latin typeface="Verdana" panose="020B0604030504040204" pitchFamily="34" charset="0"/>
+                <a:ea typeface="Verdana" panose="020B0604030504040204" pitchFamily="34" charset="0"/>
+                <a:cs typeface="Verdana" panose="020B0604030504040204" pitchFamily="34" charset="0"/>
+              </a:rPr>
+              <a:t>There</a:t>
+            </a:r>
+            <a:r>
+              <a:rPr lang="en-US" b="0" baseline="0" dirty="0" smtClean="0">
+                <a:latin typeface="Verdana" panose="020B0604030504040204" pitchFamily="34" charset="0"/>
+                <a:ea typeface="Verdana" panose="020B0604030504040204" pitchFamily="34" charset="0"/>
+                <a:cs typeface="Verdana" panose="020B0604030504040204" pitchFamily="34" charset="0"/>
+              </a:rPr>
+              <a:t> are plenty of others. </a:t>
+            </a:r>
+            <a:endParaRPr lang="en-US" b="0" dirty="0" smtClean="0">
+              <a:latin typeface="Verdana" panose="020B0604030504040204" pitchFamily="34" charset="0"/>
+              <a:ea typeface="Verdana" panose="020B0604030504040204" pitchFamily="34" charset="0"/>
+              <a:cs typeface="Verdana" panose="020B0604030504040204" pitchFamily="34" charset="0"/>
+            </a:endParaRPr>
+          </a:p>
+          <a:p>
+            <a:pPr>
+              <a:lnSpc>
+                <a:spcPct val="120000"/>
+              </a:lnSpc>
+            </a:pPr>
+            <a:endParaRPr lang="en-US" baseline="0" dirty="0" smtClean="0">
+              <a:latin typeface="Verdana" panose="020B0604030504040204" pitchFamily="34" charset="0"/>
+              <a:ea typeface="Verdana" panose="020B0604030504040204" pitchFamily="34" charset="0"/>
+              <a:cs typeface="Verdana" panose="020B0604030504040204" pitchFamily="34" charset="0"/>
+            </a:endParaRPr>
+          </a:p>
+          <a:p>
+            <a:pPr>
+              <a:lnSpc>
+                <a:spcPct val="120000"/>
+              </a:lnSpc>
+            </a:pPr>
+            <a:r>
+              <a:rPr lang="en-US" baseline="0" dirty="0" smtClean="0">
+                <a:latin typeface="Verdana" panose="020B0604030504040204" pitchFamily="34" charset="0"/>
+                <a:ea typeface="Verdana" panose="020B0604030504040204" pitchFamily="34" charset="0"/>
+                <a:cs typeface="Verdana" panose="020B0604030504040204" pitchFamily="34" charset="0"/>
+              </a:rPr>
+              <a:t>The landscape was so limited, a </a:t>
+            </a:r>
+            <a:r>
+              <a:rPr lang="en-US" dirty="0" smtClean="0">
+                <a:latin typeface="Verdana" panose="020B0604030504040204" pitchFamily="34" charset="0"/>
+                <a:ea typeface="Verdana" panose="020B0604030504040204" pitchFamily="34" charset="0"/>
+                <a:cs typeface="Verdana" panose="020B0604030504040204" pitchFamily="34" charset="0"/>
+              </a:rPr>
+              <a:t>dedicated </a:t>
+            </a:r>
+            <a:r>
+              <a:rPr lang="en-US" dirty="0" smtClean="0">
+                <a:latin typeface="Verdana" panose="020B0604030504040204" pitchFamily="34" charset="0"/>
+                <a:ea typeface="Verdana" panose="020B0604030504040204" pitchFamily="34" charset="0"/>
+                <a:cs typeface="Verdana" panose="020B0604030504040204" pitchFamily="34" charset="0"/>
+              </a:rPr>
+              <a:t>developer could keep </a:t>
+            </a:r>
+            <a:r>
+              <a:rPr lang="en-US" dirty="0" smtClean="0">
+                <a:latin typeface="Verdana" panose="020B0604030504040204" pitchFamily="34" charset="0"/>
+                <a:ea typeface="Verdana" panose="020B0604030504040204" pitchFamily="34" charset="0"/>
+                <a:cs typeface="Verdana" panose="020B0604030504040204" pitchFamily="34" charset="0"/>
+              </a:rPr>
+              <a:t>the majority of cross</a:t>
+            </a:r>
+            <a:r>
+              <a:rPr lang="en-US" baseline="0" dirty="0" smtClean="0">
+                <a:latin typeface="Verdana" panose="020B0604030504040204" pitchFamily="34" charset="0"/>
+                <a:ea typeface="Verdana" panose="020B0604030504040204" pitchFamily="34" charset="0"/>
+                <a:cs typeface="Verdana" panose="020B0604030504040204" pitchFamily="34" charset="0"/>
+              </a:rPr>
+              <a:t> </a:t>
+            </a:r>
+            <a:r>
+              <a:rPr lang="en-US" dirty="0" smtClean="0">
+                <a:latin typeface="Verdana" panose="020B0604030504040204" pitchFamily="34" charset="0"/>
+                <a:ea typeface="Verdana" panose="020B0604030504040204" pitchFamily="34" charset="0"/>
+                <a:cs typeface="Verdana" panose="020B0604030504040204" pitchFamily="34" charset="0"/>
+              </a:rPr>
+              <a:t>browser issues </a:t>
+            </a:r>
+            <a:r>
+              <a:rPr lang="en-US" baseline="0" dirty="0" smtClean="0">
+                <a:latin typeface="Verdana" panose="020B0604030504040204" pitchFamily="34" charset="0"/>
+                <a:ea typeface="Verdana" panose="020B0604030504040204" pitchFamily="34" charset="0"/>
+                <a:cs typeface="Verdana" panose="020B0604030504040204" pitchFamily="34" charset="0"/>
+              </a:rPr>
+              <a:t>in their head and code around them by hand. </a:t>
+            </a:r>
+            <a:endParaRPr lang="en-US" baseline="0" dirty="0" smtClean="0">
+              <a:latin typeface="Verdana" panose="020B0604030504040204" pitchFamily="34" charset="0"/>
+              <a:ea typeface="Verdana" panose="020B0604030504040204" pitchFamily="34" charset="0"/>
+              <a:cs typeface="Verdana" panose="020B0604030504040204" pitchFamily="34" charset="0"/>
+            </a:endParaRPr>
+          </a:p>
+          <a:p>
+            <a:pPr>
+              <a:lnSpc>
+                <a:spcPct val="120000"/>
+              </a:lnSpc>
+            </a:pPr>
+            <a:endParaRPr lang="en-US" baseline="0" dirty="0" smtClean="0">
+              <a:latin typeface="Verdana" panose="020B0604030504040204" pitchFamily="34" charset="0"/>
+              <a:ea typeface="Verdana" panose="020B0604030504040204" pitchFamily="34" charset="0"/>
+              <a:cs typeface="Verdana" panose="020B0604030504040204" pitchFamily="34" charset="0"/>
+            </a:endParaRPr>
+          </a:p>
+          <a:p>
+            <a:pPr>
+              <a:lnSpc>
+                <a:spcPct val="120000"/>
+              </a:lnSpc>
+            </a:pPr>
+            <a:r>
+              <a:rPr lang="en-US" baseline="0" dirty="0" smtClean="0">
+                <a:latin typeface="Verdana" panose="020B0604030504040204" pitchFamily="34" charset="0"/>
+                <a:ea typeface="Verdana" panose="020B0604030504040204" pitchFamily="34" charset="0"/>
+                <a:cs typeface="Verdana" panose="020B0604030504040204" pitchFamily="34" charset="0"/>
+              </a:rPr>
+              <a:t>Peter Paul Koch’s compatibility tables were a lot easier to digest. </a:t>
+            </a:r>
+          </a:p>
+          <a:p>
+            <a:pPr>
+              <a:lnSpc>
+                <a:spcPct val="120000"/>
+              </a:lnSpc>
+            </a:pPr>
+            <a:endParaRPr lang="en-US" baseline="0" dirty="0" smtClean="0">
+              <a:latin typeface="Verdana" panose="020B0604030504040204" pitchFamily="34" charset="0"/>
+              <a:ea typeface="Verdana" panose="020B0604030504040204" pitchFamily="34" charset="0"/>
+              <a:cs typeface="Verdana" panose="020B0604030504040204" pitchFamily="34" charset="0"/>
+            </a:endParaRPr>
+          </a:p>
+          <a:p>
+            <a:pPr>
+              <a:lnSpc>
+                <a:spcPct val="120000"/>
+              </a:lnSpc>
+            </a:pPr>
+            <a:endParaRPr lang="en-US" baseline="0" dirty="0" smtClean="0">
+              <a:latin typeface="Verdana" panose="020B0604030504040204" pitchFamily="34" charset="0"/>
+              <a:ea typeface="Verdana" panose="020B0604030504040204" pitchFamily="34" charset="0"/>
+              <a:cs typeface="Verdana" panose="020B0604030504040204" pitchFamily="34" charset="0"/>
+            </a:endParaRPr>
+          </a:p>
+          <a:p>
+            <a:pPr>
+              <a:lnSpc>
+                <a:spcPct val="120000"/>
+              </a:lnSpc>
+            </a:pPr>
+            <a:r>
+              <a:rPr lang="en-US" baseline="0" dirty="0" smtClean="0">
+                <a:latin typeface="Verdana" panose="020B0604030504040204" pitchFamily="34" charset="0"/>
+                <a:ea typeface="Verdana" panose="020B0604030504040204" pitchFamily="34" charset="0"/>
+                <a:cs typeface="Verdana" panose="020B0604030504040204" pitchFamily="34" charset="0"/>
+              </a:rPr>
+              <a:t>We had a c</a:t>
+            </a:r>
+            <a:r>
+              <a:rPr lang="en-US" dirty="0" smtClean="0">
+                <a:latin typeface="Verdana" panose="020B0604030504040204" pitchFamily="34" charset="0"/>
+                <a:ea typeface="Verdana" panose="020B0604030504040204" pitchFamily="34" charset="0"/>
+                <a:cs typeface="Verdana" panose="020B0604030504040204" pitchFamily="34" charset="0"/>
+              </a:rPr>
+              <a:t>alcified specification landscape</a:t>
             </a:r>
           </a:p>
           <a:p>
@@ -5013,7 +5153,15 @@
                 <a:ea typeface="Verdana" panose="020B0604030504040204" pitchFamily="34" charset="0"/>
                 <a:cs typeface="Verdana" panose="020B0604030504040204" pitchFamily="34" charset="0"/>
               </a:rPr>
-              <a:t>XML 1.0</a:t>
+              <a:t>Between December 1997 and September 2001 we had several major</a:t>
+            </a:r>
+            <a:r>
+              <a:rPr lang="en-US" baseline="0" dirty="0" smtClean="0">
+                <a:latin typeface="Verdana" panose="020B0604030504040204" pitchFamily="34" charset="0"/>
+                <a:ea typeface="Verdana" panose="020B0604030504040204" pitchFamily="34" charset="0"/>
+                <a:cs typeface="Verdana" panose="020B0604030504040204" pitchFamily="34" charset="0"/>
+              </a:rPr>
+              <a:t> releases. </a:t>
             </a:r>
           </a:p>
           <a:p>
@@ -5029,7 +5177,7 @@
                 <a:ea typeface="Verdana" panose="020B0604030504040204" pitchFamily="34" charset="0"/>
                 <a:cs typeface="Verdana" panose="020B0604030504040204" pitchFamily="34" charset="0"/>
               </a:rPr>
-              <a:t>CSS level 2</a:t>
+              <a:t>HTML4.0</a:t>
             </a:r>
           </a:p>
           <a:p>
@@ -5045,15 +5193,7 @@
                 <a:ea typeface="Verdana" panose="020B0604030504040204" pitchFamily="34" charset="0"/>
                 <a:cs typeface="Verdana" panose="020B0604030504040204" pitchFamily="34" charset="0"/>
               </a:rPr>
-              <a:t>ECMAScript </a:t>
-            </a:r>
-            <a:r>
-              <a:rPr lang="en-US" dirty="0" smtClean="0">
-                <a:latin typeface="Verdana" panose="020B0604030504040204" pitchFamily="34" charset="0"/>
-                <a:ea typeface="Verdana" panose="020B0604030504040204" pitchFamily="34" charset="0"/>
-                <a:cs typeface="Verdana" panose="020B0604030504040204" pitchFamily="34" charset="0"/>
-              </a:rPr>
-              <a:t>version 3.0,</a:t>
+              <a:t>XML 1.0</a:t>
             </a:r>
           </a:p>
           <a:p>
@@ -5069,7 +5209,7 @@
                 <a:ea typeface="Verdana" panose="020B0604030504040204" pitchFamily="34" charset="0"/>
                 <a:cs typeface="Verdana" panose="020B0604030504040204" pitchFamily="34" charset="0"/>
               </a:rPr>
-              <a:t>XHTML 1.0,</a:t>
+              <a:t>CSS level 2</a:t>
             </a:r>
           </a:p>
           <a:p>
@@ -5085,7 +5225,7 @@
                 <a:ea typeface="Verdana" panose="020B0604030504040204" pitchFamily="34" charset="0"/>
                 <a:cs typeface="Verdana" panose="020B0604030504040204" pitchFamily="34" charset="0"/>
               </a:rPr>
-              <a:t>SVG 1.0</a:t>
+              <a:t>ECMAScript version 3.0,</a:t>
             </a:r>
           </a:p>
           <a:p>
@@ -5101,7 +5241,52 @@
                 <a:ea typeface="Verdana" panose="020B0604030504040204" pitchFamily="34" charset="0"/>
                 <a:cs typeface="Verdana" panose="020B0604030504040204" pitchFamily="34" charset="0"/>
               </a:rPr>
+              <a:t>XHTML 1.0,</a:t>
+            </a:r>
+          </a:p>
+          <a:p>
+            <a:pPr marL="0" lvl="1" defTabSz="931774">
+              <a:lnSpc>
+                <a:spcPct val="120000"/>
+              </a:lnSpc>
+              <a:defRPr/>
+            </a:pPr>
+            <a:r>
+              <a:rPr lang="en-US" dirty="0" smtClean="0">
+                <a:latin typeface="Verdana" panose="020B0604030504040204" pitchFamily="34" charset="0"/>
+                <a:ea typeface="Verdana" panose="020B0604030504040204" pitchFamily="34" charset="0"/>
+                <a:cs typeface="Verdana" panose="020B0604030504040204" pitchFamily="34" charset="0"/>
+              </a:rPr>
+              <a:t>SVG 1.0</a:t>
+            </a:r>
+          </a:p>
+          <a:p>
+            <a:pPr marL="0" lvl="1" defTabSz="931774">
+              <a:lnSpc>
+                <a:spcPct val="120000"/>
+              </a:lnSpc>
+              <a:defRPr/>
+            </a:pPr>
+            <a:r>
+              <a:rPr lang="en-US" dirty="0" smtClean="0">
+                <a:latin typeface="Verdana" panose="020B0604030504040204" pitchFamily="34" charset="0"/>
+                <a:ea typeface="Verdana" panose="020B0604030504040204" pitchFamily="34" charset="0"/>
+                <a:cs typeface="Verdana" panose="020B0604030504040204" pitchFamily="34" charset="0"/>
+              </a:rPr>
               <a:t>After that… not much happened for many years on the specification front</a:t>
+            </a:r>
+          </a:p>
+          <a:p>
+            <a:endParaRPr lang="en-US" dirty="0" smtClean="0"/>
+          </a:p>
+          <a:p>
+            <a:r>
+              <a:rPr lang="en-US" dirty="0" smtClean="0"/>
+              <a:t>And IE wasn’t updated for years</a:t>
+            </a:r>
+            <a:r>
+              <a:rPr lang="en-US" baseline="0" dirty="0" smtClean="0"/>
+              <a:t> after its release in 2001. </a:t>
             </a:r>
           </a:p>
           <a:p>
@@ -6064,29 +6249,8 @@
                 <a:ea typeface="Verdana" panose="020B0604030504040204" pitchFamily="34" charset="0"/>
                 <a:cs typeface="Verdana" panose="020B0604030504040204" pitchFamily="34" charset="0"/>
               </a:rPr>
-              <a:t>I have a theory that this </a:t>
-            </a:r>
-            <a:r>
-              <a:rPr lang="en-US" dirty="0" smtClean="0">
-                <a:latin typeface="Verdana" panose="020B0604030504040204" pitchFamily="34" charset="0"/>
-                <a:ea typeface="Verdana" panose="020B0604030504040204" pitchFamily="34" charset="0"/>
-                <a:cs typeface="Verdana" panose="020B0604030504040204" pitchFamily="34" charset="0"/>
-              </a:rPr>
-              <a:t>behavior is at least part of the reason why people have such a visceral dislike of IE- including later versions which are actually quite easy work with. Since so many people save IE for later on in the development process, or downright ignore it, their only experience with the browser is one of shock and </a:t>
-            </a:r>
-            <a:r>
-              <a:rPr lang="en-US" dirty="0" smtClean="0">
-                <a:latin typeface="Verdana" panose="020B0604030504040204" pitchFamily="34" charset="0"/>
-                <a:ea typeface="Verdana" panose="020B0604030504040204" pitchFamily="34" charset="0"/>
-                <a:cs typeface="Verdana" panose="020B0604030504040204" pitchFamily="34" charset="0"/>
-              </a:rPr>
-              <a:t>betrayal when bugs pop up. </a:t>
-            </a:r>
-            <a:endParaRPr lang="en-US" dirty="0" smtClean="0">
-              <a:latin typeface="Verdana" panose="020B0604030504040204" pitchFamily="34" charset="0"/>
-              <a:ea typeface="Verdana" panose="020B0604030504040204" pitchFamily="34" charset="0"/>
-              <a:cs typeface="Verdana" panose="020B0604030504040204" pitchFamily="34" charset="0"/>
-            </a:endParaRPr>
+              <a:t>I have a theory that this behavior is at least part of the reason why people have such a visceral dislike of IE- including later versions which are actually quite easy work with. Since so many people save IE for later on in the development process, or downright ignore it, their only experience with the browser is one of shock and betrayal when bugs pop up. </a:t>
+            </a:r>
           </a:p>
           <a:p>
             <a:r>
@@ -6461,7 +6625,23 @@
                 <a:ea typeface="Verdana" panose="020B0604030504040204" pitchFamily="34" charset="0"/>
                 <a:cs typeface="Verdana" panose="020B0604030504040204" pitchFamily="34" charset="0"/>
               </a:rPr>
-              <a:t>The WHATWG was formed</a:t>
+              <a:t>The WHATWG was </a:t>
+            </a:r>
+            <a:r>
+              <a:rPr lang="en-US" dirty="0" smtClean="0">
+                <a:latin typeface="Verdana" panose="020B0604030504040204" pitchFamily="34" charset="0"/>
+                <a:ea typeface="Verdana" panose="020B0604030504040204" pitchFamily="34" charset="0"/>
+                <a:cs typeface="Verdana" panose="020B0604030504040204" pitchFamily="34" charset="0"/>
+              </a:rPr>
+              <a:t>formed. That eventually gave</a:t>
+            </a:r>
+            <a:r>
+              <a:rPr lang="en-US" baseline="0" dirty="0" smtClean="0">
+                <a:latin typeface="Verdana" panose="020B0604030504040204" pitchFamily="34" charset="0"/>
+                <a:ea typeface="Verdana" panose="020B0604030504040204" pitchFamily="34" charset="0"/>
+                <a:cs typeface="Verdana" panose="020B0604030504040204" pitchFamily="34" charset="0"/>
+              </a:rPr>
+              <a:t> us HTML5 (or the Living Standard, if you prefer- I’m not stepping in the middle of that one today.)</a:t>
             </a:r>
           </a:p>
           <a:p>
@@ -6470,14 +6650,11 @@
                 <a:spcPct val="120000"/>
               </a:lnSpc>
             </a:pPr>
-            <a:r>
-              <a:rPr lang="en-US" dirty="0" smtClean="0">
-                <a:latin typeface="Verdana" panose="020B0604030504040204" pitchFamily="34" charset="0"/>
-                <a:ea typeface="Verdana" panose="020B0604030504040204" pitchFamily="34" charset="0"/>
-                <a:cs typeface="Verdana" panose="020B0604030504040204" pitchFamily="34" charset="0"/>
-              </a:rPr>
-              <a:t>Ajax-based development + the explosion of JavaScript Libraries (esp. jQuery) meant the open web platform was cool again</a:t>
-            </a:r>
+            <a:endParaRPr lang="en-US" dirty="0" smtClean="0">
+              <a:latin typeface="Verdana" panose="020B0604030504040204" pitchFamily="34" charset="0"/>
+              <a:ea typeface="Verdana" panose="020B0604030504040204" pitchFamily="34" charset="0"/>
+              <a:cs typeface="Verdana" panose="020B0604030504040204" pitchFamily="34" charset="0"/>
+            </a:endParaRPr>
           </a:p>
           <a:p>
             <a:pPr>
@@ -6491,7 +6668,39 @@
                 <a:ea typeface="Verdana" panose="020B0604030504040204" pitchFamily="34" charset="0"/>
                 <a:cs typeface="Verdana" panose="020B0604030504040204" pitchFamily="34" charset="0"/>
               </a:rPr>
-              <a:t>New browsers came online (Firefox, Chrome, Safari,) Opera continued to fight for the open web</a:t>
+              <a:t>Ajax-based development + the explosion of JavaScript Libraries (esp. jQuery) </a:t>
+            </a:r>
+            <a:r>
+              <a:rPr lang="en-US" dirty="0" smtClean="0">
+                <a:latin typeface="Verdana" panose="020B0604030504040204" pitchFamily="34" charset="0"/>
+                <a:ea typeface="Verdana" panose="020B0604030504040204" pitchFamily="34" charset="0"/>
+                <a:cs typeface="Verdana" panose="020B0604030504040204" pitchFamily="34" charset="0"/>
+              </a:rPr>
+              <a:t>to support Ajax-based</a:t>
+            </a:r>
+            <a:r>
+              <a:rPr lang="en-US" baseline="0" dirty="0" smtClean="0">
+                <a:latin typeface="Verdana" panose="020B0604030504040204" pitchFamily="34" charset="0"/>
+                <a:ea typeface="Verdana" panose="020B0604030504040204" pitchFamily="34" charset="0"/>
+                <a:cs typeface="Verdana" panose="020B0604030504040204" pitchFamily="34" charset="0"/>
+              </a:rPr>
+              <a:t> development </a:t>
+            </a:r>
+            <a:r>
+              <a:rPr lang="en-US" dirty="0" smtClean="0">
+                <a:latin typeface="Verdana" panose="020B0604030504040204" pitchFamily="34" charset="0"/>
+                <a:ea typeface="Verdana" panose="020B0604030504040204" pitchFamily="34" charset="0"/>
+                <a:cs typeface="Verdana" panose="020B0604030504040204" pitchFamily="34" charset="0"/>
+              </a:rPr>
+              <a:t>meant </a:t>
+            </a:r>
+            <a:r>
+              <a:rPr lang="en-US" dirty="0" smtClean="0">
+                <a:latin typeface="Verdana" panose="020B0604030504040204" pitchFamily="34" charset="0"/>
+                <a:ea typeface="Verdana" panose="020B0604030504040204" pitchFamily="34" charset="0"/>
+                <a:cs typeface="Verdana" panose="020B0604030504040204" pitchFamily="34" charset="0"/>
+              </a:rPr>
+              <a:t>the open web platform was cool again</a:t>
             </a:r>
           </a:p>
           <a:p>
@@ -6500,14 +6709,11 @@
                 <a:spcPct val="120000"/>
               </a:lnSpc>
             </a:pPr>
-            <a:r>
-              <a:rPr lang="en-US" dirty="0" smtClean="0">
-                <a:latin typeface="Verdana" panose="020B0604030504040204" pitchFamily="34" charset="0"/>
-                <a:ea typeface="Verdana" panose="020B0604030504040204" pitchFamily="34" charset="0"/>
-                <a:cs typeface="Verdana" panose="020B0604030504040204" pitchFamily="34" charset="0"/>
-              </a:rPr>
-              <a:t>Even IE was eventually reborn since they had real competition on multiple fronts</a:t>
-            </a:r>
+            <a:endParaRPr lang="en-US" dirty="0" smtClean="0">
+              <a:latin typeface="Verdana" panose="020B0604030504040204" pitchFamily="34" charset="0"/>
+              <a:ea typeface="Verdana" panose="020B0604030504040204" pitchFamily="34" charset="0"/>
+              <a:cs typeface="Verdana" panose="020B0604030504040204" pitchFamily="34" charset="0"/>
+            </a:endParaRPr>
           </a:p>
           <a:p>
             <a:pPr>
@@ -6521,8 +6727,227 @@
                 <a:ea typeface="Verdana" panose="020B0604030504040204" pitchFamily="34" charset="0"/>
                 <a:cs typeface="Verdana" panose="020B0604030504040204" pitchFamily="34" charset="0"/>
               </a:rPr>
-              <a:t>A new dedication to standards development by the W3C </a:t>
-            </a:r>
+              <a:t>New </a:t>
+            </a:r>
+            <a:r>
+              <a:rPr lang="en-US" dirty="0" smtClean="0">
+                <a:latin typeface="Verdana" panose="020B0604030504040204" pitchFamily="34" charset="0"/>
+                <a:ea typeface="Verdana" panose="020B0604030504040204" pitchFamily="34" charset="0"/>
+                <a:cs typeface="Verdana" panose="020B0604030504040204" pitchFamily="34" charset="0"/>
+              </a:rPr>
+              <a:t>browsers came </a:t>
+            </a:r>
+            <a:r>
+              <a:rPr lang="en-US" dirty="0" smtClean="0">
+                <a:latin typeface="Verdana" panose="020B0604030504040204" pitchFamily="34" charset="0"/>
+                <a:ea typeface="Verdana" panose="020B0604030504040204" pitchFamily="34" charset="0"/>
+                <a:cs typeface="Verdana" panose="020B0604030504040204" pitchFamily="34" charset="0"/>
+              </a:rPr>
+              <a:t>online</a:t>
+            </a:r>
+            <a:r>
+              <a:rPr lang="en-US" baseline="0" dirty="0" smtClean="0">
+                <a:latin typeface="Verdana" panose="020B0604030504040204" pitchFamily="34" charset="0"/>
+                <a:ea typeface="Verdana" panose="020B0604030504040204" pitchFamily="34" charset="0"/>
+                <a:cs typeface="Verdana" panose="020B0604030504040204" pitchFamily="34" charset="0"/>
+              </a:rPr>
+              <a:t> in the form of </a:t>
+            </a:r>
+            <a:r>
+              <a:rPr lang="en-US" dirty="0" smtClean="0">
+                <a:latin typeface="Verdana" panose="020B0604030504040204" pitchFamily="34" charset="0"/>
+                <a:ea typeface="Verdana" panose="020B0604030504040204" pitchFamily="34" charset="0"/>
+                <a:cs typeface="Verdana" panose="020B0604030504040204" pitchFamily="34" charset="0"/>
+              </a:rPr>
+              <a:t>Firefox, the heir</a:t>
+            </a:r>
+            <a:r>
+              <a:rPr lang="en-US" baseline="0" dirty="0" smtClean="0">
+                <a:latin typeface="Verdana" panose="020B0604030504040204" pitchFamily="34" charset="0"/>
+                <a:ea typeface="Verdana" panose="020B0604030504040204" pitchFamily="34" charset="0"/>
+                <a:cs typeface="Verdana" panose="020B0604030504040204" pitchFamily="34" charset="0"/>
+              </a:rPr>
+              <a:t> to Netscape Navigator,</a:t>
+            </a:r>
+            <a:r>
+              <a:rPr lang="en-US" dirty="0" smtClean="0">
+                <a:latin typeface="Verdana" panose="020B0604030504040204" pitchFamily="34" charset="0"/>
+                <a:ea typeface="Verdana" panose="020B0604030504040204" pitchFamily="34" charset="0"/>
+                <a:cs typeface="Verdana" panose="020B0604030504040204" pitchFamily="34" charset="0"/>
+              </a:rPr>
+              <a:t> Google’s Chrome</a:t>
+            </a:r>
+            <a:r>
+              <a:rPr lang="en-US" dirty="0" smtClean="0">
+                <a:latin typeface="Verdana" panose="020B0604030504040204" pitchFamily="34" charset="0"/>
+                <a:ea typeface="Verdana" panose="020B0604030504040204" pitchFamily="34" charset="0"/>
+                <a:cs typeface="Verdana" panose="020B0604030504040204" pitchFamily="34" charset="0"/>
+              </a:rPr>
+              <a:t>, </a:t>
+            </a:r>
+            <a:r>
+              <a:rPr lang="en-US" dirty="0" smtClean="0">
+                <a:latin typeface="Verdana" panose="020B0604030504040204" pitchFamily="34" charset="0"/>
+                <a:ea typeface="Verdana" panose="020B0604030504040204" pitchFamily="34" charset="0"/>
+                <a:cs typeface="Verdana" panose="020B0604030504040204" pitchFamily="34" charset="0"/>
+              </a:rPr>
+              <a:t>and Apple’s Safari </a:t>
+            </a:r>
+          </a:p>
+          <a:p>
+            <a:pPr>
+              <a:lnSpc>
+                <a:spcPct val="120000"/>
+              </a:lnSpc>
+            </a:pPr>
+            <a:endParaRPr lang="en-US" dirty="0" smtClean="0">
+              <a:latin typeface="Verdana" panose="020B0604030504040204" pitchFamily="34" charset="0"/>
+              <a:ea typeface="Verdana" panose="020B0604030504040204" pitchFamily="34" charset="0"/>
+              <a:cs typeface="Verdana" panose="020B0604030504040204" pitchFamily="34" charset="0"/>
+            </a:endParaRPr>
+          </a:p>
+          <a:p>
+            <a:pPr>
+              <a:lnSpc>
+                <a:spcPct val="120000"/>
+              </a:lnSpc>
+            </a:pPr>
+            <a:r>
+              <a:rPr lang="en-US" dirty="0" smtClean="0">
+                <a:latin typeface="Verdana" panose="020B0604030504040204" pitchFamily="34" charset="0"/>
+                <a:ea typeface="Verdana" panose="020B0604030504040204" pitchFamily="34" charset="0"/>
+                <a:cs typeface="Verdana" panose="020B0604030504040204" pitchFamily="34" charset="0"/>
+              </a:rPr>
+              <a:t>Opera </a:t>
+            </a:r>
+            <a:r>
+              <a:rPr lang="en-US" dirty="0" smtClean="0">
+                <a:latin typeface="Verdana" panose="020B0604030504040204" pitchFamily="34" charset="0"/>
+                <a:ea typeface="Verdana" panose="020B0604030504040204" pitchFamily="34" charset="0"/>
+                <a:cs typeface="Verdana" panose="020B0604030504040204" pitchFamily="34" charset="0"/>
+              </a:rPr>
+              <a:t>continued to fight for the open </a:t>
+            </a:r>
+            <a:r>
+              <a:rPr lang="en-US" dirty="0" smtClean="0">
+                <a:latin typeface="Verdana" panose="020B0604030504040204" pitchFamily="34" charset="0"/>
+                <a:ea typeface="Verdana" panose="020B0604030504040204" pitchFamily="34" charset="0"/>
+                <a:cs typeface="Verdana" panose="020B0604030504040204" pitchFamily="34" charset="0"/>
+              </a:rPr>
+              <a:t>web and improved their standards support across the board </a:t>
+            </a:r>
+          </a:p>
+          <a:p>
+            <a:pPr>
+              <a:lnSpc>
+                <a:spcPct val="120000"/>
+              </a:lnSpc>
+            </a:pPr>
+            <a:endParaRPr lang="en-US" dirty="0" smtClean="0">
+              <a:latin typeface="Verdana" panose="020B0604030504040204" pitchFamily="34" charset="0"/>
+              <a:ea typeface="Verdana" panose="020B0604030504040204" pitchFamily="34" charset="0"/>
+              <a:cs typeface="Verdana" panose="020B0604030504040204" pitchFamily="34" charset="0"/>
+            </a:endParaRPr>
+          </a:p>
+          <a:p>
+            <a:pPr>
+              <a:lnSpc>
+                <a:spcPct val="120000"/>
+              </a:lnSpc>
+            </a:pPr>
+            <a:r>
+              <a:rPr lang="en-US" dirty="0" smtClean="0">
+                <a:latin typeface="Verdana" panose="020B0604030504040204" pitchFamily="34" charset="0"/>
+                <a:ea typeface="Verdana" panose="020B0604030504040204" pitchFamily="34" charset="0"/>
+                <a:cs typeface="Verdana" panose="020B0604030504040204" pitchFamily="34" charset="0"/>
+              </a:rPr>
+              <a:t>Even IE was eventually reborn since they had real competition on multiple </a:t>
+            </a:r>
+            <a:r>
+              <a:rPr lang="en-US" dirty="0" smtClean="0">
+                <a:latin typeface="Verdana" panose="020B0604030504040204" pitchFamily="34" charset="0"/>
+                <a:ea typeface="Verdana" panose="020B0604030504040204" pitchFamily="34" charset="0"/>
+                <a:cs typeface="Verdana" panose="020B0604030504040204" pitchFamily="34" charset="0"/>
+              </a:rPr>
+              <a:t>fronts. IE7</a:t>
+            </a:r>
+            <a:r>
+              <a:rPr lang="en-US" baseline="0" dirty="0" smtClean="0">
+                <a:latin typeface="Verdana" panose="020B0604030504040204" pitchFamily="34" charset="0"/>
+                <a:ea typeface="Verdana" panose="020B0604030504040204" pitchFamily="34" charset="0"/>
+                <a:cs typeface="Verdana" panose="020B0604030504040204" pitchFamily="34" charset="0"/>
+              </a:rPr>
+              <a:t> and IE8 were baby steps, of course, but the pressure finally got to the folks at Microsoft and successive releases of the browser have brought the Internet Explorer family close to parity with the rest of the world. </a:t>
+            </a:r>
+            <a:endParaRPr lang="en-US" dirty="0" smtClean="0">
+              <a:latin typeface="Verdana" panose="020B0604030504040204" pitchFamily="34" charset="0"/>
+              <a:ea typeface="Verdana" panose="020B0604030504040204" pitchFamily="34" charset="0"/>
+              <a:cs typeface="Verdana" panose="020B0604030504040204" pitchFamily="34" charset="0"/>
+            </a:endParaRPr>
+          </a:p>
+          <a:p>
+            <a:pPr>
+              <a:lnSpc>
+                <a:spcPct val="120000"/>
+              </a:lnSpc>
+            </a:pPr>
+            <a:endParaRPr lang="en-US" dirty="0" smtClean="0">
+              <a:latin typeface="Verdana" panose="020B0604030504040204" pitchFamily="34" charset="0"/>
+              <a:ea typeface="Verdana" panose="020B0604030504040204" pitchFamily="34" charset="0"/>
+              <a:cs typeface="Verdana" panose="020B0604030504040204" pitchFamily="34" charset="0"/>
+            </a:endParaRPr>
+          </a:p>
+          <a:p>
+            <a:pPr>
+              <a:lnSpc>
+                <a:spcPct val="120000"/>
+              </a:lnSpc>
+            </a:pPr>
+            <a:r>
+              <a:rPr lang="en-US" dirty="0" smtClean="0">
+                <a:latin typeface="Verdana" panose="020B0604030504040204" pitchFamily="34" charset="0"/>
+                <a:ea typeface="Verdana" panose="020B0604030504040204" pitchFamily="34" charset="0"/>
+                <a:cs typeface="Verdana" panose="020B0604030504040204" pitchFamily="34" charset="0"/>
+              </a:rPr>
+              <a:t>A new dedication to standards development by the </a:t>
+            </a:r>
+            <a:r>
+              <a:rPr lang="en-US" dirty="0" smtClean="0">
+                <a:latin typeface="Verdana" panose="020B0604030504040204" pitchFamily="34" charset="0"/>
+                <a:ea typeface="Verdana" panose="020B0604030504040204" pitchFamily="34" charset="0"/>
+                <a:cs typeface="Verdana" panose="020B0604030504040204" pitchFamily="34" charset="0"/>
+              </a:rPr>
+              <a:t>W3C-</a:t>
+            </a:r>
+            <a:r>
+              <a:rPr lang="en-US" baseline="0" dirty="0" smtClean="0">
+                <a:latin typeface="Verdana" panose="020B0604030504040204" pitchFamily="34" charset="0"/>
+                <a:ea typeface="Verdana" panose="020B0604030504040204" pitchFamily="34" charset="0"/>
+                <a:cs typeface="Verdana" panose="020B0604030504040204" pitchFamily="34" charset="0"/>
+              </a:rPr>
+              <a:t> notably dumping </a:t>
+            </a:r>
+            <a:r>
+              <a:rPr lang="en-US" baseline="0" dirty="0" err="1" smtClean="0">
+                <a:latin typeface="Verdana" panose="020B0604030504040204" pitchFamily="34" charset="0"/>
+                <a:ea typeface="Verdana" panose="020B0604030504040204" pitchFamily="34" charset="0"/>
+                <a:cs typeface="Verdana" panose="020B0604030504040204" pitchFamily="34" charset="0"/>
+              </a:rPr>
+              <a:t>xhtml</a:t>
+            </a:r>
+            <a:r>
+              <a:rPr lang="en-US" baseline="0" dirty="0" smtClean="0">
+                <a:latin typeface="Verdana" panose="020B0604030504040204" pitchFamily="34" charset="0"/>
+                <a:ea typeface="Verdana" panose="020B0604030504040204" pitchFamily="34" charset="0"/>
+                <a:cs typeface="Verdana" panose="020B0604030504040204" pitchFamily="34" charset="0"/>
+              </a:rPr>
+              <a:t> 2.0 to focus on what would become HTML5. </a:t>
+            </a:r>
+            <a:endParaRPr lang="en-US" dirty="0" smtClean="0">
+              <a:latin typeface="Verdana" panose="020B0604030504040204" pitchFamily="34" charset="0"/>
+              <a:ea typeface="Verdana" panose="020B0604030504040204" pitchFamily="34" charset="0"/>
+              <a:cs typeface="Verdana" panose="020B0604030504040204" pitchFamily="34" charset="0"/>
+            </a:endParaRPr>
           </a:p>
           <a:p>
             <a:endParaRPr lang="en-US" dirty="0"/>
@@ -6615,11 +7040,7 @@
             </a:r>
             <a:r>
               <a:rPr lang="en-US" baseline="0" dirty="0" smtClean="0"/>
-              <a:t> my stack is so </a:t>
-            </a:r>
-            <a:r>
-              <a:rPr lang="en-US" baseline="0" dirty="0" smtClean="0"/>
-              <a:t>beautiful…</a:t>
+              <a:t> my stack is so beautiful…</a:t>
             </a:r>
             <a:endParaRPr lang="en-US" dirty="0"/>
           </a:p>
@@ -7676,8 +8097,100 @@
           <a:p>
             <a:r>
               <a:rPr lang="en-US" baseline="0" dirty="0" smtClean="0"/>
-              <a:t>Three are so many permutations of capability, orientation, and speed in these devices it would take forever to list them all and what the differences mean for a developer. We’ll leave it at: it’s complicated. </a:t>
-            </a:r>
+              <a:t>What are we looking at here?</a:t>
+            </a:r>
+          </a:p>
+          <a:p>
+            <a:endParaRPr lang="en-US" baseline="0" dirty="0" smtClean="0"/>
+          </a:p>
+          <a:p>
+            <a:r>
+              <a:rPr lang="en-US" dirty="0" smtClean="0"/>
+              <a:t>A convertible laptop (a Lenovo Yoga to be precise) running Windows 8.1 and set up as a laptop. This is a traditional laptop that also has a touchscreen. It has a trackpad, and I occasionally run an external mouse on it.</a:t>
+            </a:r>
+          </a:p>
+          <a:p>
+            <a:r>
+              <a:rPr lang="en-US" dirty="0" smtClean="0"/>
+              <a:t>The Lenovo Yoga in tablet mode. In this configuration, the only input is touch. The trackpad, which is now folded to the back, is turned off.</a:t>
+            </a:r>
+          </a:p>
+          <a:p>
+            <a:r>
+              <a:rPr lang="en-US" dirty="0" smtClean="0"/>
+              <a:t>The Lenovo Yoga, in tablet mode, with a Wacom tablet attached. This is a fine-grained pointing device that works, effectively, like a mouse, even if the rest of the device is a tablet.</a:t>
+            </a:r>
+          </a:p>
+          <a:p>
+            <a:r>
+              <a:rPr lang="en-US" dirty="0" smtClean="0"/>
+              <a:t>The Lenovo Yoga, in laptop mode, with a Wacom tablet attached. This is basically two mice and a touchscreen</a:t>
+            </a:r>
+          </a:p>
+          <a:p>
+            <a:r>
+              <a:rPr lang="en-US" dirty="0" smtClean="0"/>
+              <a:t>The Galaxy Note II with the stylus out. This pen is as fine-grained as a mouse and offers hover capability. I often use this when I’m visiting a site that only has a desktop view.</a:t>
+            </a:r>
+          </a:p>
+          <a:p>
+            <a:r>
+              <a:rPr lang="en-US" dirty="0" smtClean="0"/>
+              <a:t>A Samsung Galaxy Note II. This is a typical, if really big, smartphone.</a:t>
+            </a:r>
+          </a:p>
+          <a:p>
+            <a:pPr marL="0" marR="0" indent="0" algn="l" defTabSz="914400" rtl="0" eaLnBrk="1" fontAlgn="auto" latinLnBrk="0" hangingPunct="1">
+              <a:lnSpc>
+                <a:spcPct val="100000"/>
+              </a:lnSpc>
+              <a:spcBef>
+                <a:spcPts val="0"/>
+              </a:spcBef>
+              <a:spcAft>
+                <a:spcPts val="0"/>
+              </a:spcAft>
+              <a:buClrTx/>
+              <a:buSzTx/>
+              <a:buFontTx/>
+              <a:buNone/>
+              <a:tabLst/>
+              <a:defRPr/>
+            </a:pPr>
+            <a:r>
+              <a:rPr lang="en-US" dirty="0" smtClean="0"/>
+              <a:t>A Windows 8.1 laptop set up as a workstation. The laptop is a touchscreen. The second monitor is not. I work on the large monitor so I’m generally confined to just a mouse and keyboard, even if I still have a touchscreen on one of my screens.</a:t>
+            </a:r>
+          </a:p>
+          <a:p>
+            <a:pPr marL="0" marR="0" indent="0" algn="l" defTabSz="914400" rtl="0" eaLnBrk="1" fontAlgn="auto" latinLnBrk="0" hangingPunct="1">
+              <a:lnSpc>
+                <a:spcPct val="100000"/>
+              </a:lnSpc>
+              <a:spcBef>
+                <a:spcPts val="0"/>
+              </a:spcBef>
+              <a:spcAft>
+                <a:spcPts val="0"/>
+              </a:spcAft>
+              <a:buClrTx/>
+              <a:buSzTx/>
+              <a:buFontTx/>
+              <a:buNone/>
+              <a:tabLst/>
+              <a:defRPr/>
+            </a:pPr>
+            <a:r>
+              <a:rPr lang="en-US" dirty="0" smtClean="0"/>
+              <a:t>A Nokia 630 Windows</a:t>
+            </a:r>
+            <a:r>
+              <a:rPr lang="en-US" baseline="0" dirty="0" smtClean="0"/>
+              <a:t> Phone 8.</a:t>
+            </a:r>
+            <a:endParaRPr lang="en-US" dirty="0" smtClean="0"/>
+          </a:p>
+          <a:p>
             <a:endParaRPr lang="en-US" dirty="0"/>
           </a:p>
         </p:txBody>
@@ -11015,17 +11528,8 @@
               <a:rPr lang="en-US" dirty="0" smtClean="0">
                 <a:latin typeface="Palatino Linotype" panose="02040502050505030304" pitchFamily="18" charset="0"/>
               </a:rPr>
-              <a:t>Web Development in a World of Ever-Changing Browsers, Platforms &amp; </a:t>
-            </a:r>
-            <a:r>
-              <a:rPr lang="en-US" dirty="0" smtClean="0">
-                <a:latin typeface="Palatino Linotype" panose="02040502050505030304" pitchFamily="18" charset="0"/>
-              </a:rPr>
-              <a:t>Compatibilities</a:t>
-            </a:r>
-            <a:endParaRPr lang="en-US" dirty="0" smtClean="0">
-              <a:latin typeface="Palatino Linotype" panose="02040502050505030304" pitchFamily="18" charset="0"/>
-            </a:endParaRPr>
+              <a:t>Web Development in a World of Ever-Changing Browsers, Platforms &amp; Compatibilities</a:t>
+            </a:r>
           </a:p>
         </p:txBody>
       </p:sp>
@@ -11627,13 +12131,7 @@
               <a:rPr lang="en-US" dirty="0" smtClean="0">
                 <a:latin typeface="Palatino Linotype" panose="02040502050505030304" pitchFamily="18" charset="0"/>
               </a:rPr>
-              <a:t>means you’ve got a </a:t>
-            </a:r>
-            <a:r>
-              <a:rPr lang="en-US" dirty="0" smtClean="0">
-                <a:latin typeface="Palatino Linotype" panose="02040502050505030304" pitchFamily="18" charset="0"/>
-              </a:rPr>
-              <a:t>phone?</a:t>
+              <a:t>means you’ve got a phone?</a:t>
             </a:r>
             <a:endParaRPr lang="en-US" dirty="0">
               <a:latin typeface="Palatino Linotype" panose="02040502050505030304" pitchFamily="18" charset="0"/>
@@ -11879,13 +12377,7 @@
               <a:rPr lang="en-US" dirty="0" smtClean="0">
                 <a:latin typeface="Palatino Linotype" panose="02040502050505030304" pitchFamily="18" charset="0"/>
               </a:rPr>
-              <a:t>One </a:t>
-            </a:r>
-            <a:r>
-              <a:rPr lang="en-US" dirty="0" smtClean="0">
-                <a:latin typeface="Palatino Linotype" panose="02040502050505030304" pitchFamily="18" charset="0"/>
-              </a:rPr>
-              <a:t>Size Fits All?</a:t>
+              <a:t>One Size Fits All?</a:t>
             </a:r>
             <a:endParaRPr lang="en-US" dirty="0">
               <a:latin typeface="Palatino Linotype" panose="02040502050505030304" pitchFamily="18" charset="0"/>
@@ -11960,31 +12452,7 @@
                 <a:ea typeface="Verdana" panose="020B0604030504040204" pitchFamily="34" charset="0"/>
                 <a:cs typeface="Verdana" panose="020B0604030504040204" pitchFamily="34" charset="0"/>
               </a:rPr>
-              <a:t>faced with complicated application patterns, </a:t>
-            </a:r>
-            <a:r>
-              <a:rPr lang="en-US" dirty="0" smtClean="0">
-                <a:latin typeface="Verdana" panose="020B0604030504040204" pitchFamily="34" charset="0"/>
-                <a:ea typeface="Verdana" panose="020B0604030504040204" pitchFamily="34" charset="0"/>
-                <a:cs typeface="Verdana" panose="020B0604030504040204" pitchFamily="34" charset="0"/>
-              </a:rPr>
-              <a:t>and, if you’re not careful,  </a:t>
-            </a:r>
-            <a:r>
-              <a:rPr lang="en-US" dirty="0" smtClean="0">
-                <a:latin typeface="Verdana" panose="020B0604030504040204" pitchFamily="34" charset="0"/>
-                <a:ea typeface="Verdana" panose="020B0604030504040204" pitchFamily="34" charset="0"/>
-                <a:cs typeface="Verdana" panose="020B0604030504040204" pitchFamily="34" charset="0"/>
-              </a:rPr>
-              <a:t>bandwidth </a:t>
-            </a:r>
-            <a:r>
-              <a:rPr lang="en-US" dirty="0" smtClean="0">
-                <a:latin typeface="Verdana" panose="020B0604030504040204" pitchFamily="34" charset="0"/>
-                <a:ea typeface="Verdana" panose="020B0604030504040204" pitchFamily="34" charset="0"/>
-                <a:cs typeface="Verdana" panose="020B0604030504040204" pitchFamily="34" charset="0"/>
-              </a:rPr>
-              <a:t>limitations.</a:t>
+              <a:t>faced with complicated application patterns, and, if you’re not careful,  bandwidth limitations.</a:t>
             </a:r>
             <a:endParaRPr lang="en-US" dirty="0">
               <a:latin typeface="Verdana" panose="020B0604030504040204" pitchFamily="34" charset="0"/>
@@ -12070,19 +12538,7 @@
               <a:rPr lang="en-US" dirty="0" smtClean="0">
                 <a:latin typeface="Palatino Linotype" panose="02040502050505030304" pitchFamily="18" charset="0"/>
               </a:rPr>
-              <a:t>So What </a:t>
-            </a:r>
-            <a:r>
-              <a:rPr lang="en-US" dirty="0" smtClean="0">
-                <a:latin typeface="Palatino Linotype" panose="02040502050505030304" pitchFamily="18" charset="0"/>
-              </a:rPr>
-              <a:t>Should We </a:t>
-            </a:r>
-            <a:r>
-              <a:rPr lang="en-US" dirty="0" smtClean="0">
-                <a:latin typeface="Palatino Linotype" panose="02040502050505030304" pitchFamily="18" charset="0"/>
-              </a:rPr>
-              <a:t>Do?</a:t>
+              <a:t>So What Should We Do?</a:t>
             </a:r>
             <a:endParaRPr lang="en-US" dirty="0">
               <a:latin typeface="Palatino Linotype" panose="02040502050505030304" pitchFamily="18" charset="0"/>
@@ -15254,23 +15710,7 @@
                 <a:ea typeface="Verdana" panose="020B0604030504040204" pitchFamily="34" charset="0"/>
                 <a:cs typeface="Verdana" panose="020B0604030504040204" pitchFamily="34" charset="0"/>
               </a:rPr>
-              <a:t>for a guy on a </a:t>
-            </a:r>
-            <a:r>
-              <a:rPr lang="en-US" dirty="0" smtClean="0">
-                <a:latin typeface="Verdana" panose="020B0604030504040204" pitchFamily="34" charset="0"/>
-                <a:ea typeface="Verdana" panose="020B0604030504040204" pitchFamily="34" charset="0"/>
-                <a:cs typeface="Verdana" panose="020B0604030504040204" pitchFamily="34" charset="0"/>
-              </a:rPr>
-              <a:t>MacBook </a:t>
-            </a:r>
-            <a:r>
-              <a:rPr lang="en-US" dirty="0" smtClean="0">
-                <a:latin typeface="Verdana" panose="020B0604030504040204" pitchFamily="34" charset="0"/>
-                <a:ea typeface="Verdana" panose="020B0604030504040204" pitchFamily="34" charset="0"/>
-                <a:cs typeface="Verdana" panose="020B0604030504040204" pitchFamily="34" charset="0"/>
-              </a:rPr>
-              <a:t>air in a coffee shop in Palo Alto or </a:t>
+              <a:t>for a guy on a MacBook air in a coffee shop in Palo Alto or </a:t>
             </a:r>
             <a:r>
               <a:rPr lang="en-US" dirty="0">
@@ -16129,23 +16569,7 @@
                 <a:ea typeface="Verdana" panose="020B0604030504040204" pitchFamily="34" charset="0"/>
                 <a:cs typeface="Verdana" panose="020B0604030504040204" pitchFamily="34" charset="0"/>
               </a:rPr>
-              <a:t>Accessibility Guidelines </a:t>
-            </a:r>
-            <a:r>
-              <a:rPr lang="en-US" dirty="0" smtClean="0">
-                <a:latin typeface="Palatino Linotype" panose="02040502050505030304" pitchFamily="18" charset="0"/>
-                <a:ea typeface="Verdana" panose="020B0604030504040204" pitchFamily="34" charset="0"/>
-                <a:cs typeface="Verdana" panose="020B0604030504040204" pitchFamily="34" charset="0"/>
-              </a:rPr>
-              <a:t>+ the </a:t>
-            </a:r>
-            <a:r>
-              <a:rPr lang="en-US" dirty="0" smtClean="0">
-                <a:latin typeface="Palatino Linotype" panose="02040502050505030304" pitchFamily="18" charset="0"/>
-                <a:ea typeface="Verdana" panose="020B0604030504040204" pitchFamily="34" charset="0"/>
-                <a:cs typeface="Verdana" panose="020B0604030504040204" pitchFamily="34" charset="0"/>
-              </a:rPr>
-              <a:t>Multi-device Landscape</a:t>
+              <a:t>Accessibility Guidelines + the Multi-device Landscape</a:t>
             </a:r>
             <a:endParaRPr lang="en-US" dirty="0">
               <a:latin typeface="Palatino Linotype" panose="02040502050505030304" pitchFamily="18" charset="0"/>
@@ -16340,11 +16764,6 @@
               </a:rPr>
               <a:t>Accessibility Guidelines + the Multi-device Landscape</a:t>
             </a:r>
-            <a:endParaRPr lang="en-US" dirty="0">
-              <a:latin typeface="Palatino Linotype" panose="02040502050505030304" pitchFamily="18" charset="0"/>
-              <a:ea typeface="Verdana" panose="020B0604030504040204" pitchFamily="34" charset="0"/>
-              <a:cs typeface="Verdana" panose="020B0604030504040204" pitchFamily="34" charset="0"/>
-            </a:endParaRPr>
           </a:p>
         </p:txBody>
       </p:sp>
@@ -16900,21 +17319,8 @@
                 <a:ea typeface="Verdana" panose="020B0604030504040204" pitchFamily="34" charset="0"/>
                 <a:cs typeface="Verdana" panose="020B0604030504040204" pitchFamily="34" charset="0"/>
               </a:rPr>
-              <a:t>IE </a:t>
-            </a:r>
-            <a:r>
-              <a:rPr lang="en-US" dirty="0" smtClean="0">
-                <a:latin typeface="Verdana" panose="020B0604030504040204" pitchFamily="34" charset="0"/>
-                <a:ea typeface="Verdana" panose="020B0604030504040204" pitchFamily="34" charset="0"/>
-                <a:cs typeface="Verdana" panose="020B0604030504040204" pitchFamily="34" charset="0"/>
-              </a:rPr>
-              <a:t>conditional comments </a:t>
-            </a:r>
-            <a:endParaRPr lang="en-US" dirty="0" smtClean="0">
-              <a:latin typeface="Verdana" panose="020B0604030504040204" pitchFamily="34" charset="0"/>
-              <a:ea typeface="Verdana" panose="020B0604030504040204" pitchFamily="34" charset="0"/>
-              <a:cs typeface="Verdana" panose="020B0604030504040204" pitchFamily="34" charset="0"/>
-            </a:endParaRPr>
+              <a:t>IE conditional comments </a:t>
+            </a:r>
           </a:p>
           <a:p>
             <a:pPr>
@@ -16972,15 +17378,7 @@
                 <a:ea typeface="Verdana" panose="020B0604030504040204" pitchFamily="34" charset="0"/>
                 <a:cs typeface="Verdana" panose="020B0604030504040204" pitchFamily="34" charset="0"/>
               </a:rPr>
-              <a:t>2, </a:t>
-            </a:r>
-            <a:r>
-              <a:rPr lang="en-US" dirty="0" smtClean="0">
-                <a:latin typeface="Verdana" panose="020B0604030504040204" pitchFamily="34" charset="0"/>
-                <a:ea typeface="Verdana" panose="020B0604030504040204" pitchFamily="34" charset="0"/>
-                <a:cs typeface="Verdana" panose="020B0604030504040204" pitchFamily="34" charset="0"/>
-              </a:rPr>
-              <a:t>ECMAScript </a:t>
+              <a:t>2, ECMAScript </a:t>
             </a:r>
             <a:r>
               <a:rPr lang="en-US" dirty="0">
@@ -17298,11 +17696,6 @@
               </a:rPr>
               <a:t>Many designers and developers have never been hands-on with an Android device. </a:t>
             </a:r>
-            <a:endParaRPr lang="en-US" dirty="0" smtClean="0">
-              <a:latin typeface="Verdana" panose="020B0604030504040204" pitchFamily="34" charset="0"/>
-              <a:ea typeface="Verdana" panose="020B0604030504040204" pitchFamily="34" charset="0"/>
-              <a:cs typeface="Verdana" panose="020B0604030504040204" pitchFamily="34" charset="0"/>
-            </a:endParaRPr>
           </a:p>
         </p:txBody>
       </p:sp>
@@ -17429,23 +17822,7 @@
                 <a:ea typeface="Verdana" panose="020B0604030504040204" pitchFamily="34" charset="0"/>
                 <a:cs typeface="Verdana" panose="020B0604030504040204" pitchFamily="34" charset="0"/>
               </a:rPr>
-              <a:t>If your vision of the web is </a:t>
-            </a:r>
-            <a:r>
-              <a:rPr lang="en-US" dirty="0" smtClean="0">
-                <a:latin typeface="Verdana" panose="020B0604030504040204" pitchFamily="34" charset="0"/>
-                <a:ea typeface="Verdana" panose="020B0604030504040204" pitchFamily="34" charset="0"/>
-                <a:cs typeface="Verdana" panose="020B0604030504040204" pitchFamily="34" charset="0"/>
-              </a:rPr>
-              <a:t>iPhone-centric, </a:t>
-            </a:r>
-            <a:r>
-              <a:rPr lang="en-US" dirty="0" smtClean="0">
-                <a:latin typeface="Verdana" panose="020B0604030504040204" pitchFamily="34" charset="0"/>
-                <a:ea typeface="Verdana" panose="020B0604030504040204" pitchFamily="34" charset="0"/>
-                <a:cs typeface="Verdana" panose="020B0604030504040204" pitchFamily="34" charset="0"/>
-              </a:rPr>
-              <a:t>inserting a back button into your web UI seems like a good idea. The thing is, every Android device has a back button built in, either as a dedicated software button on screen or as a physical button on the device.</a:t>
+              <a:t>If your vision of the web is iPhone-centric, inserting a back button into your web UI seems like a good idea. The thing is, every Android device has a back button built in, either as a dedicated software button on screen or as a physical button on the device.</a:t>
             </a:r>
           </a:p>
           <a:p>
@@ -18975,19 +19352,7 @@
                 <a:cs typeface="Verdana" panose="020B0604030504040204" pitchFamily="34" charset="0"/>
                 <a:hlinkClick r:id="rId5" tooltip="Go to Jeff Kubina's photostream"/>
               </a:rPr>
-              <a:t>Jeff </a:t>
-            </a:r>
-            <a:r>
-              <a:rPr lang="en-US" sz="1200" dirty="0" smtClean="0">
-                <a:solidFill>
-                  <a:schemeClr val="bg1"/>
-                </a:solidFill>
-                <a:latin typeface="Verdana" panose="020B0604030504040204" pitchFamily="34" charset="0"/>
-                <a:ea typeface="Verdana" panose="020B0604030504040204" pitchFamily="34" charset="0"/>
-                <a:cs typeface="Verdana" panose="020B0604030504040204" pitchFamily="34" charset="0"/>
-                <a:hlinkClick r:id="rId5" tooltip="Go to Jeff Kubina's photostream"/>
-              </a:rPr>
-              <a:t>Kubina</a:t>
+              <a:t>Jeff Kubina</a:t>
             </a:r>
             <a:r>
               <a:rPr lang="en-US" sz="1200" dirty="0">
@@ -19237,15 +19602,7 @@
                 <a:ea typeface="Verdana" panose="020B0604030504040204" pitchFamily="34" charset="0"/>
                 <a:cs typeface="Verdana" panose="020B0604030504040204" pitchFamily="34" charset="0"/>
               </a:rPr>
-              <a:t>Don’t </a:t>
-            </a:r>
-            <a:r>
-              <a:rPr lang="en-US" dirty="0" smtClean="0">
-                <a:latin typeface="Palatino Linotype" panose="02040502050505030304" pitchFamily="18" charset="0"/>
-                <a:ea typeface="Verdana" panose="020B0604030504040204" pitchFamily="34" charset="0"/>
-                <a:cs typeface="Verdana" panose="020B0604030504040204" pitchFamily="34" charset="0"/>
-              </a:rPr>
-              <a:t>Turn HTML back in XHTML</a:t>
+              <a:t>Don’t Turn HTML back in XHTML</a:t>
             </a:r>
             <a:endParaRPr lang="en-US" dirty="0">
               <a:latin typeface="Palatino Linotype" panose="02040502050505030304" pitchFamily="18" charset="0"/>
@@ -20692,15 +21049,7 @@
                 <a:ea typeface="Verdana" panose="020B0604030504040204" pitchFamily="34" charset="0"/>
                 <a:cs typeface="Verdana" panose="020B0604030504040204" pitchFamily="34" charset="0"/>
               </a:rPr>
-              <a:t>B</a:t>
-            </a:r>
-            <a:r>
-              <a:rPr lang="en-US" dirty="0" smtClean="0">
-                <a:latin typeface="Verdana" panose="020B0604030504040204" pitchFamily="34" charset="0"/>
-                <a:ea typeface="Verdana" panose="020B0604030504040204" pitchFamily="34" charset="0"/>
-                <a:cs typeface="Verdana" panose="020B0604030504040204" pitchFamily="34" charset="0"/>
-              </a:rPr>
-              <a:t>log:</a:t>
+              <a:t>Blog:</a:t>
             </a:r>
             <a:r>
               <a:rPr lang="en-US" dirty="0">
@@ -20738,15 +21087,7 @@
                 <a:ea typeface="Verdana" panose="020B0604030504040204" pitchFamily="34" charset="0"/>
                 <a:cs typeface="Verdana" panose="020B0604030504040204" pitchFamily="34" charset="0"/>
               </a:rPr>
-              <a:t>B</a:t>
-            </a:r>
-            <a:r>
-              <a:rPr lang="en-US" dirty="0" smtClean="0">
-                <a:latin typeface="Verdana" panose="020B0604030504040204" pitchFamily="34" charset="0"/>
-                <a:ea typeface="Verdana" panose="020B0604030504040204" pitchFamily="34" charset="0"/>
-                <a:cs typeface="Verdana" panose="020B0604030504040204" pitchFamily="34" charset="0"/>
-              </a:rPr>
-              <a:t>ooks: </a:t>
+              <a:t>Books: </a:t>
             </a:r>
             <a:r>
               <a:rPr lang="en-US" dirty="0" smtClean="0">

</xml_diff>